<commit_message>
Worked on Exercise 3
</commit_message>
<xml_diff>
--- a/Ex3/MicroEx3.pptx
+++ b/Ex3/MicroEx3.pptx
@@ -13422,7 +13422,7 @@
           <p:nvPr>
             <p:extLst>
               <p:ext uri="{D42A27DB-BD31-4B8C-83A1-F6EECF244321}">
-                <p14:modId xmlns:p14="http://schemas.microsoft.com/office/powerpoint/2010/main" val="256205940"/>
+                <p14:modId xmlns:p14="http://schemas.microsoft.com/office/powerpoint/2010/main" val="567447980"/>
               </p:ext>
             </p:extLst>
           </p:nvPr>
@@ -14053,7 +14053,7 @@
                           <a:cs typeface="+mn-cs"/>
                           <a:sym typeface="Arial"/>
                         </a:rPr>
-                        <a:t>Write (P0</a:t>
+                        <a:t>Write (P0)</a:t>
                       </a:r>
                       <a:endParaRPr lang="en-US" b="1" dirty="0">
                         <a:solidFill>
@@ -15558,46 +15558,6 @@
                         </a:rPr>
                         <a:t>signal</a:t>
                       </a:r>
-                      <a:r>
-                        <a:rPr lang="de-DE" b="1" dirty="0">
-                          <a:solidFill>
-                            <a:schemeClr val="tx1"/>
-                          </a:solidFill>
-                        </a:rPr>
-                        <a:t> (oder muss </a:t>
-                      </a:r>
-                      <a:r>
-                        <a:rPr lang="de-DE" b="1" dirty="0" err="1">
-                          <a:solidFill>
-                            <a:schemeClr val="tx1"/>
-                          </a:solidFill>
-                        </a:rPr>
-                        <a:t>cache</a:t>
-                      </a:r>
-                      <a:r>
-                        <a:rPr lang="de-DE" b="1" dirty="0">
-                          <a:solidFill>
-                            <a:schemeClr val="tx1"/>
-                          </a:solidFill>
-                        </a:rPr>
-                        <a:t> </a:t>
-                      </a:r>
-                      <a:r>
-                        <a:rPr lang="de-DE" b="1" dirty="0" err="1">
-                          <a:solidFill>
-                            <a:schemeClr val="tx1"/>
-                          </a:solidFill>
-                        </a:rPr>
-                        <a:t>line</a:t>
-                      </a:r>
-                      <a:r>
-                        <a:rPr lang="de-DE" b="1" dirty="0">
-                          <a:solidFill>
-                            <a:schemeClr val="tx1"/>
-                          </a:solidFill>
-                        </a:rPr>
-                        <a:t> vorher explizit geladen werden?)</a:t>
-                      </a:r>
                       <a:endParaRPr lang="en-US" b="1" dirty="0">
                         <a:solidFill>
                           <a:schemeClr val="tx1"/>
@@ -16577,6 +16537,95 @@
                     <a:bodyPr/>
                     <a:lstStyle/>
                     <a:p>
+                      <a:r>
+                        <a:rPr lang="de-DE" b="1" dirty="0">
+                          <a:solidFill>
+                            <a:schemeClr val="tx1"/>
+                          </a:solidFill>
+                        </a:rPr>
+                        <a:t>Write miss </a:t>
+                      </a:r>
+                      <a:r>
+                        <a:rPr lang="de-DE" b="1" dirty="0">
+                          <a:solidFill>
+                            <a:schemeClr val="tx1"/>
+                          </a:solidFill>
+                          <a:sym typeface="Wingdings" panose="05000000000000000000" pitchFamily="2" charset="2"/>
+                        </a:rPr>
+                        <a:t> </a:t>
+                      </a:r>
+                      <a:r>
+                        <a:rPr lang="de-DE" b="1" dirty="0" err="1">
+                          <a:solidFill>
+                            <a:schemeClr val="tx1"/>
+                          </a:solidFill>
+                          <a:sym typeface="Wingdings" panose="05000000000000000000" pitchFamily="2" charset="2"/>
+                        </a:rPr>
+                        <a:t>Invalidate</a:t>
+                      </a:r>
+                      <a:r>
+                        <a:rPr lang="de-DE" b="1" dirty="0">
+                          <a:solidFill>
+                            <a:schemeClr val="tx1"/>
+                          </a:solidFill>
+                          <a:sym typeface="Wingdings" panose="05000000000000000000" pitchFamily="2" charset="2"/>
+                        </a:rPr>
+                        <a:t> </a:t>
+                      </a:r>
+                      <a:r>
+                        <a:rPr lang="de-DE" b="1" dirty="0" err="1">
+                          <a:solidFill>
+                            <a:schemeClr val="tx1"/>
+                          </a:solidFill>
+                          <a:sym typeface="Wingdings" panose="05000000000000000000" pitchFamily="2" charset="2"/>
+                        </a:rPr>
+                        <a:t>signal</a:t>
+                      </a:r>
+                      <a:r>
+                        <a:rPr lang="de-DE" b="1" dirty="0">
+                          <a:solidFill>
+                            <a:schemeClr val="tx1"/>
+                          </a:solidFill>
+                          <a:sym typeface="Wingdings" panose="05000000000000000000" pitchFamily="2" charset="2"/>
+                        </a:rPr>
+                        <a:t> </a:t>
+                      </a:r>
+                      <a:r>
+                        <a:rPr lang="de-DE" b="1" dirty="0" err="1">
+                          <a:solidFill>
+                            <a:schemeClr val="tx1"/>
+                          </a:solidFill>
+                          <a:sym typeface="Wingdings" panose="05000000000000000000" pitchFamily="2" charset="2"/>
+                        </a:rPr>
+                        <a:t>to</a:t>
+                      </a:r>
+                      <a:r>
+                        <a:rPr lang="de-DE" b="1" dirty="0">
+                          <a:solidFill>
+                            <a:schemeClr val="tx1"/>
+                          </a:solidFill>
+                          <a:sym typeface="Wingdings" panose="05000000000000000000" pitchFamily="2" charset="2"/>
+                        </a:rPr>
+                        <a:t> C1, C2 </a:t>
+                      </a:r>
+                      <a:r>
+                        <a:rPr lang="de-DE" b="1" dirty="0" err="1">
+                          <a:solidFill>
+                            <a:schemeClr val="tx1"/>
+                          </a:solidFill>
+                          <a:sym typeface="Wingdings" panose="05000000000000000000" pitchFamily="2" charset="2"/>
+                        </a:rPr>
+                        <a:t>and</a:t>
+                      </a:r>
+                      <a:r>
+                        <a:rPr lang="de-DE" b="1" dirty="0">
+                          <a:solidFill>
+                            <a:schemeClr val="tx1"/>
+                          </a:solidFill>
+                          <a:sym typeface="Wingdings" panose="05000000000000000000" pitchFamily="2" charset="2"/>
+                        </a:rPr>
+                        <a:t> C3</a:t>
+                      </a:r>
                       <a:endParaRPr lang="en-US" b="1" dirty="0">
                         <a:solidFill>
                           <a:schemeClr val="tx1"/>
@@ -16917,6 +16966,230 @@
                           </a:solidFill>
                         </a:rPr>
                         <a:t>signal</a:t>
+                      </a:r>
+                      <a:r>
+                        <a:rPr lang="de-DE" b="1" baseline="0" dirty="0">
+                          <a:solidFill>
+                            <a:schemeClr val="tx1"/>
+                          </a:solidFill>
+                        </a:rPr>
+                        <a:t> </a:t>
+                      </a:r>
+                      <a:r>
+                        <a:rPr lang="de-DE" b="1" baseline="0" dirty="0">
+                          <a:solidFill>
+                            <a:schemeClr val="tx1"/>
+                          </a:solidFill>
+                          <a:sym typeface="Wingdings" panose="05000000000000000000" pitchFamily="2" charset="2"/>
+                        </a:rPr>
+                        <a:t> C0 </a:t>
+                      </a:r>
+                      <a:r>
+                        <a:rPr lang="de-DE" b="1" baseline="0" dirty="0" err="1">
+                          <a:solidFill>
+                            <a:schemeClr val="tx1"/>
+                          </a:solidFill>
+                          <a:sym typeface="Wingdings" panose="05000000000000000000" pitchFamily="2" charset="2"/>
+                        </a:rPr>
+                        <a:t>writes</a:t>
+                      </a:r>
+                      <a:r>
+                        <a:rPr lang="de-DE" b="1" baseline="0" dirty="0">
+                          <a:solidFill>
+                            <a:schemeClr val="tx1"/>
+                          </a:solidFill>
+                          <a:sym typeface="Wingdings" panose="05000000000000000000" pitchFamily="2" charset="2"/>
+                        </a:rPr>
+                        <a:t> </a:t>
+                      </a:r>
+                      <a:r>
+                        <a:rPr lang="de-DE" b="1" baseline="0" dirty="0" err="1">
+                          <a:solidFill>
+                            <a:schemeClr val="tx1"/>
+                          </a:solidFill>
+                          <a:sym typeface="Wingdings" panose="05000000000000000000" pitchFamily="2" charset="2"/>
+                        </a:rPr>
+                        <a:t>cache</a:t>
+                      </a:r>
+                      <a:r>
+                        <a:rPr lang="de-DE" b="1" baseline="0" dirty="0">
+                          <a:solidFill>
+                            <a:schemeClr val="tx1"/>
+                          </a:solidFill>
+                          <a:sym typeface="Wingdings" panose="05000000000000000000" pitchFamily="2" charset="2"/>
+                        </a:rPr>
+                        <a:t> </a:t>
+                      </a:r>
+                      <a:r>
+                        <a:rPr lang="de-DE" b="1" baseline="0" dirty="0" err="1">
+                          <a:solidFill>
+                            <a:schemeClr val="tx1"/>
+                          </a:solidFill>
+                          <a:sym typeface="Wingdings" panose="05000000000000000000" pitchFamily="2" charset="2"/>
+                        </a:rPr>
+                        <a:t>line</a:t>
+                      </a:r>
+                      <a:r>
+                        <a:rPr lang="de-DE" b="1" baseline="0" dirty="0">
+                          <a:solidFill>
+                            <a:schemeClr val="tx1"/>
+                          </a:solidFill>
+                          <a:sym typeface="Wingdings" panose="05000000000000000000" pitchFamily="2" charset="2"/>
+                        </a:rPr>
+                        <a:t> back </a:t>
+                      </a:r>
+                      <a:r>
+                        <a:rPr lang="de-DE" b="1" baseline="0" dirty="0" err="1">
+                          <a:solidFill>
+                            <a:schemeClr val="tx1"/>
+                          </a:solidFill>
+                          <a:sym typeface="Wingdings" panose="05000000000000000000" pitchFamily="2" charset="2"/>
+                        </a:rPr>
+                        <a:t>to</a:t>
+                      </a:r>
+                      <a:r>
+                        <a:rPr lang="de-DE" b="1" baseline="0" dirty="0">
+                          <a:solidFill>
+                            <a:schemeClr val="tx1"/>
+                          </a:solidFill>
+                          <a:sym typeface="Wingdings" panose="05000000000000000000" pitchFamily="2" charset="2"/>
+                        </a:rPr>
+                        <a:t> </a:t>
+                      </a:r>
+                      <a:r>
+                        <a:rPr lang="de-DE" b="1" baseline="0" dirty="0" err="1">
+                          <a:solidFill>
+                            <a:schemeClr val="tx1"/>
+                          </a:solidFill>
+                          <a:sym typeface="Wingdings" panose="05000000000000000000" pitchFamily="2" charset="2"/>
+                        </a:rPr>
+                        <a:t>main</a:t>
+                      </a:r>
+                      <a:r>
+                        <a:rPr lang="de-DE" b="1" baseline="0" dirty="0">
+                          <a:solidFill>
+                            <a:schemeClr val="tx1"/>
+                          </a:solidFill>
+                          <a:sym typeface="Wingdings" panose="05000000000000000000" pitchFamily="2" charset="2"/>
+                        </a:rPr>
+                        <a:t> </a:t>
+                      </a:r>
+                      <a:r>
+                        <a:rPr lang="de-DE" b="1" baseline="0" dirty="0" err="1">
+                          <a:solidFill>
+                            <a:schemeClr val="tx1"/>
+                          </a:solidFill>
+                          <a:sym typeface="Wingdings" panose="05000000000000000000" pitchFamily="2" charset="2"/>
+                        </a:rPr>
+                        <a:t>memory</a:t>
+                      </a:r>
+                      <a:r>
+                        <a:rPr lang="de-DE" b="1" baseline="0" dirty="0">
+                          <a:solidFill>
+                            <a:schemeClr val="tx1"/>
+                          </a:solidFill>
+                          <a:sym typeface="Wingdings" panose="05000000000000000000" pitchFamily="2" charset="2"/>
+                        </a:rPr>
+                        <a:t>  C1 </a:t>
+                      </a:r>
+                      <a:r>
+                        <a:rPr lang="de-DE" b="1" baseline="0" dirty="0" err="1">
+                          <a:solidFill>
+                            <a:schemeClr val="tx1"/>
+                          </a:solidFill>
+                          <a:sym typeface="Wingdings" panose="05000000000000000000" pitchFamily="2" charset="2"/>
+                        </a:rPr>
+                        <a:t>loads</a:t>
+                      </a:r>
+                      <a:r>
+                        <a:rPr lang="de-DE" b="1" baseline="0" dirty="0">
+                          <a:solidFill>
+                            <a:schemeClr val="tx1"/>
+                          </a:solidFill>
+                          <a:sym typeface="Wingdings" panose="05000000000000000000" pitchFamily="2" charset="2"/>
+                        </a:rPr>
+                        <a:t> </a:t>
+                      </a:r>
+                      <a:r>
+                        <a:rPr lang="de-DE" b="1" baseline="0" dirty="0" err="1">
+                          <a:solidFill>
+                            <a:schemeClr val="tx1"/>
+                          </a:solidFill>
+                          <a:sym typeface="Wingdings" panose="05000000000000000000" pitchFamily="2" charset="2"/>
+                        </a:rPr>
+                        <a:t>cache</a:t>
+                      </a:r>
+                      <a:r>
+                        <a:rPr lang="de-DE" b="1" baseline="0" dirty="0">
+                          <a:solidFill>
+                            <a:schemeClr val="tx1"/>
+                          </a:solidFill>
+                          <a:sym typeface="Wingdings" panose="05000000000000000000" pitchFamily="2" charset="2"/>
+                        </a:rPr>
+                        <a:t> </a:t>
+                      </a:r>
+                      <a:r>
+                        <a:rPr lang="de-DE" b="1" baseline="0" dirty="0" err="1">
+                          <a:solidFill>
+                            <a:schemeClr val="tx1"/>
+                          </a:solidFill>
+                          <a:sym typeface="Wingdings" panose="05000000000000000000" pitchFamily="2" charset="2"/>
+                        </a:rPr>
+                        <a:t>line</a:t>
+                      </a:r>
+                      <a:r>
+                        <a:rPr lang="de-DE" b="1" baseline="0" dirty="0">
+                          <a:solidFill>
+                            <a:schemeClr val="tx1"/>
+                          </a:solidFill>
+                          <a:sym typeface="Wingdings" panose="05000000000000000000" pitchFamily="2" charset="2"/>
+                        </a:rPr>
+                        <a:t> </a:t>
+                      </a:r>
+                      <a:r>
+                        <a:rPr lang="de-DE" b="1" baseline="0" dirty="0" err="1">
+                          <a:solidFill>
+                            <a:schemeClr val="tx1"/>
+                          </a:solidFill>
+                          <a:sym typeface="Wingdings" panose="05000000000000000000" pitchFamily="2" charset="2"/>
+                        </a:rPr>
+                        <a:t>and</a:t>
+                      </a:r>
+                      <a:r>
+                        <a:rPr lang="de-DE" b="1" baseline="0" dirty="0">
+                          <a:solidFill>
+                            <a:schemeClr val="tx1"/>
+                          </a:solidFill>
+                          <a:sym typeface="Wingdings" panose="05000000000000000000" pitchFamily="2" charset="2"/>
+                        </a:rPr>
+                        <a:t> </a:t>
+                      </a:r>
+                      <a:r>
+                        <a:rPr lang="de-DE" b="1" baseline="0" dirty="0" err="1">
+                          <a:solidFill>
+                            <a:schemeClr val="tx1"/>
+                          </a:solidFill>
+                          <a:sym typeface="Wingdings" panose="05000000000000000000" pitchFamily="2" charset="2"/>
+                        </a:rPr>
+                        <a:t>modifies</a:t>
+                      </a:r>
+                      <a:r>
+                        <a:rPr lang="de-DE" b="1" baseline="0" dirty="0">
+                          <a:solidFill>
+                            <a:schemeClr val="tx1"/>
+                          </a:solidFill>
+                          <a:sym typeface="Wingdings" panose="05000000000000000000" pitchFamily="2" charset="2"/>
+                        </a:rPr>
+                        <a:t> </a:t>
+                      </a:r>
+                      <a:r>
+                        <a:rPr lang="de-DE" b="1" baseline="0">
+                          <a:solidFill>
+                            <a:schemeClr val="tx1"/>
+                          </a:solidFill>
+                          <a:sym typeface="Wingdings" panose="05000000000000000000" pitchFamily="2" charset="2"/>
+                        </a:rPr>
+                        <a:t>it</a:t>
                       </a:r>
                       <a:endParaRPr lang="en-US" b="1" dirty="0">
                         <a:solidFill>

</xml_diff>

<commit_message>
Added Ex4 sheet and corrected Ex3
</commit_message>
<xml_diff>
--- a/Ex3/MicroEx3.pptx
+++ b/Ex3/MicroEx3.pptx
@@ -13422,7 +13422,7 @@
           <p:nvPr>
             <p:extLst>
               <p:ext uri="{D42A27DB-BD31-4B8C-83A1-F6EECF244321}">
-                <p14:modId xmlns:p14="http://schemas.microsoft.com/office/powerpoint/2010/main" val="567447980"/>
+                <p14:modId xmlns:p14="http://schemas.microsoft.com/office/powerpoint/2010/main" val="2732815629"/>
               </p:ext>
             </p:extLst>
           </p:nvPr>
@@ -15013,7 +15013,16 @@
                           </a:solidFill>
                           <a:sym typeface="Wingdings" panose="05000000000000000000" pitchFamily="2" charset="2"/>
                         </a:rPr>
-                        <a:t>  C1 </a:t>
+                        <a:t> </a:t>
+                      </a:r>
+                      <a:r>
+                        <a:rPr lang="de-DE" b="1" baseline="0">
+                          <a:solidFill>
+                            <a:schemeClr val="tx1"/>
+                          </a:solidFill>
+                          <a:sym typeface="Wingdings" panose="05000000000000000000" pitchFamily="2" charset="2"/>
+                        </a:rPr>
+                        <a:t> C0 </a:t>
                       </a:r>
                       <a:r>
                         <a:rPr lang="de-DE" b="1" baseline="0" dirty="0" err="1">

</xml_diff>